<commit_message>
Merging Carrie's changes, part two
</commit_message>
<xml_diff>
--- a/docs/img/icds_docs_images.pptx
+++ b/docs/img/icds_docs_images.pptx
@@ -208,7 +208,7 @@
           <a:p>
             <a:fld id="{8F25345D-83D0-4643-B4BC-44C238B5A8CF}" type="datetimeFigureOut">
               <a:rPr lang="en-US" smtClean="0"/>
-              <a:t>1/14/2025</a:t>
+              <a:t>10/9/24</a:t>
             </a:fld>
             <a:endParaRPr lang="en-US"/>
           </a:p>
@@ -790,7 +790,7 @@
           <a:p>
             <a:fld id="{06F6D09A-9F42-C649-A6EB-DC34432B03F0}" type="datetimeFigureOut">
               <a:rPr lang="en-US" smtClean="0"/>
-              <a:t>1/14/2025</a:t>
+              <a:t>10/9/24</a:t>
             </a:fld>
             <a:endParaRPr lang="en-US"/>
           </a:p>
@@ -988,7 +988,7 @@
           <a:p>
             <a:fld id="{06F6D09A-9F42-C649-A6EB-DC34432B03F0}" type="datetimeFigureOut">
               <a:rPr lang="en-US" smtClean="0"/>
-              <a:t>1/14/2025</a:t>
+              <a:t>10/9/24</a:t>
             </a:fld>
             <a:endParaRPr lang="en-US"/>
           </a:p>
@@ -1196,7 +1196,7 @@
           <a:p>
             <a:fld id="{06F6D09A-9F42-C649-A6EB-DC34432B03F0}" type="datetimeFigureOut">
               <a:rPr lang="en-US" smtClean="0"/>
-              <a:t>1/14/2025</a:t>
+              <a:t>10/9/24</a:t>
             </a:fld>
             <a:endParaRPr lang="en-US"/>
           </a:p>
@@ -1394,7 +1394,7 @@
           <a:p>
             <a:fld id="{06F6D09A-9F42-C649-A6EB-DC34432B03F0}" type="datetimeFigureOut">
               <a:rPr lang="en-US" smtClean="0"/>
-              <a:t>1/14/2025</a:t>
+              <a:t>10/9/24</a:t>
             </a:fld>
             <a:endParaRPr lang="en-US"/>
           </a:p>
@@ -1669,7 +1669,7 @@
           <a:p>
             <a:fld id="{06F6D09A-9F42-C649-A6EB-DC34432B03F0}" type="datetimeFigureOut">
               <a:rPr lang="en-US" smtClean="0"/>
-              <a:t>1/14/2025</a:t>
+              <a:t>10/9/24</a:t>
             </a:fld>
             <a:endParaRPr lang="en-US"/>
           </a:p>
@@ -1934,7 +1934,7 @@
           <a:p>
             <a:fld id="{06F6D09A-9F42-C649-A6EB-DC34432B03F0}" type="datetimeFigureOut">
               <a:rPr lang="en-US" smtClean="0"/>
-              <a:t>1/14/2025</a:t>
+              <a:t>10/9/24</a:t>
             </a:fld>
             <a:endParaRPr lang="en-US"/>
           </a:p>
@@ -2346,7 +2346,7 @@
           <a:p>
             <a:fld id="{06F6D09A-9F42-C649-A6EB-DC34432B03F0}" type="datetimeFigureOut">
               <a:rPr lang="en-US" smtClean="0"/>
-              <a:t>1/14/2025</a:t>
+              <a:t>10/9/24</a:t>
             </a:fld>
             <a:endParaRPr lang="en-US"/>
           </a:p>
@@ -2487,7 +2487,7 @@
           <a:p>
             <a:fld id="{06F6D09A-9F42-C649-A6EB-DC34432B03F0}" type="datetimeFigureOut">
               <a:rPr lang="en-US" smtClean="0"/>
-              <a:t>1/14/2025</a:t>
+              <a:t>10/9/24</a:t>
             </a:fld>
             <a:endParaRPr lang="en-US"/>
           </a:p>
@@ -2600,7 +2600,7 @@
           <a:p>
             <a:fld id="{06F6D09A-9F42-C649-A6EB-DC34432B03F0}" type="datetimeFigureOut">
               <a:rPr lang="en-US" smtClean="0"/>
-              <a:t>1/14/2025</a:t>
+              <a:t>10/9/24</a:t>
             </a:fld>
             <a:endParaRPr lang="en-US"/>
           </a:p>
@@ -2911,7 +2911,7 @@
           <a:p>
             <a:fld id="{06F6D09A-9F42-C649-A6EB-DC34432B03F0}" type="datetimeFigureOut">
               <a:rPr lang="en-US" smtClean="0"/>
-              <a:t>1/14/2025</a:t>
+              <a:t>10/9/24</a:t>
             </a:fld>
             <a:endParaRPr lang="en-US"/>
           </a:p>
@@ -3203,7 +3203,7 @@
           <a:p>
             <a:fld id="{06F6D09A-9F42-C649-A6EB-DC34432B03F0}" type="datetimeFigureOut">
               <a:rPr lang="en-US" smtClean="0"/>
-              <a:t>1/14/2025</a:t>
+              <a:t>10/9/24</a:t>
             </a:fld>
             <a:endParaRPr lang="en-US"/>
           </a:p>
@@ -3444,7 +3444,7 @@
           <a:p>
             <a:fld id="{06F6D09A-9F42-C649-A6EB-DC34432B03F0}" type="datetimeFigureOut">
               <a:rPr lang="en-US" smtClean="0"/>
-              <a:t>1/14/2025</a:t>
+              <a:t>10/9/24</a:t>
             </a:fld>
             <a:endParaRPr lang="en-US"/>
           </a:p>
@@ -9267,7 +9267,7 @@
                   <a:schemeClr val="tx1"/>
                 </a:solidFill>
               </a:rPr>
-              <a:t>rr-datamgr.rr.hpc.psu.edu</a:t>
+              <a:t>rr-datamgr01.hpc.psu.edu</a:t>
             </a:r>
           </a:p>
         </p:txBody>
@@ -10667,7 +10667,7 @@
                   <a:schemeClr val="tx1"/>
                 </a:solidFill>
               </a:rPr>
-              <a:t>rr-datamgr.rr.hpc.psu.edu</a:t>
+              <a:t>rr-datamgr01.hpc.psu.edu</a:t>
             </a:r>
           </a:p>
         </p:txBody>
@@ -11276,6 +11276,53 @@
 </file>
 
 <file path=customXml/item1.xml><?xml version="1.0" encoding="utf-8"?>
+<p:properties xmlns:p="http://schemas.microsoft.com/office/2006/metadata/properties" xmlns:xsi="http://www.w3.org/2001/XMLSchema-instance" xmlns:pc="http://schemas.microsoft.com/office/infopath/2007/PartnerControls">
+  <documentManagement>
+    <SharedWithUsers xmlns="4b28dc4c-da69-43c9-a1ff-3a3813db799e">
+      <UserInfo>
+        <DisplayName>Futrick, Jordan Q</DisplayName>
+        <AccountId>31</AccountId>
+        <AccountType/>
+      </UserInfo>
+      <UserInfo>
+        <DisplayName>Brown, Carrie</DisplayName>
+        <AccountId>84</AccountId>
+        <AccountType/>
+      </UserInfo>
+      <UserInfo>
+        <DisplayName>Leydig, Derek Martin</DisplayName>
+        <AccountId>38</AccountId>
+        <AccountType/>
+      </UserInfo>
+      <UserInfo>
+        <DisplayName>Jackson, Liam</DisplayName>
+        <AccountId>32</AccountId>
+        <AccountType/>
+      </UserInfo>
+      <UserInfo>
+        <DisplayName>Hey, Wolf</DisplayName>
+        <AccountId>182</AccountId>
+        <AccountType/>
+      </UserInfo>
+    </SharedWithUsers>
+    <TaxCatchAll xmlns="4b28dc4c-da69-43c9-a1ff-3a3813db799e" xsi:nil="true"/>
+    <lcf76f155ced4ddcb4097134ff3c332f xmlns="23ad9178-ade2-434f-a880-cfaf139256ed">
+      <Terms xmlns="http://schemas.microsoft.com/office/infopath/2007/PartnerControls"/>
+    </lcf76f155ced4ddcb4097134ff3c332f>
+  </documentManagement>
+</p:properties>
+</file>
+
+<file path=customXml/item2.xml><?xml version="1.0" encoding="utf-8"?>
+<?mso-contentType ?>
+<FormTemplates xmlns="http://schemas.microsoft.com/sharepoint/v3/contenttype/forms">
+  <Display>DocumentLibraryForm</Display>
+  <Edit>DocumentLibraryForm</Edit>
+  <New>DocumentLibraryForm</New>
+</FormTemplates>
+</file>
+
+<file path=customXml/item3.xml><?xml version="1.0" encoding="utf-8"?>
 <ct:contentTypeSchema xmlns:ct="http://schemas.microsoft.com/office/2006/metadata/contentType" xmlns:ma="http://schemas.microsoft.com/office/2006/metadata/properties/metaAttributes" ct:_="" ma:_="" ma:contentTypeName="Document" ma:contentTypeID="0x010100E843CC197C4EA6429DB8706FA366B0A9" ma:contentTypeVersion="16" ma:contentTypeDescription="Create a new document." ma:contentTypeScope="" ma:versionID="b4700a85abd1a74edb701ca6d3afdd96">
   <xsd:schema xmlns:xsd="http://www.w3.org/2001/XMLSchema" xmlns:xs="http://www.w3.org/2001/XMLSchema" xmlns:p="http://schemas.microsoft.com/office/2006/metadata/properties" xmlns:ns2="4b28dc4c-da69-43c9-a1ff-3a3813db799e" xmlns:ns3="23ad9178-ade2-434f-a880-cfaf139256ed" targetNamespace="http://schemas.microsoft.com/office/2006/metadata/properties" ma:root="true" ma:fieldsID="19eeb97119fa32ac520f06cf83d0de92" ns2:_="" ns3:_="">
     <xsd:import namespace="4b28dc4c-da69-43c9-a1ff-3a3813db799e"/>
@@ -11518,54 +11565,34 @@
 </ct:contentTypeSchema>
 </file>
 
-<file path=customXml/item2.xml><?xml version="1.0" encoding="utf-8"?>
-<?mso-contentType ?>
-<FormTemplates xmlns="http://schemas.microsoft.com/sharepoint/v3/contenttype/forms">
-  <Display>DocumentLibraryForm</Display>
-  <Edit>DocumentLibraryForm</Edit>
-  <New>DocumentLibraryForm</New>
-</FormTemplates>
+<file path=customXml/itemProps1.xml><?xml version="1.0" encoding="utf-8"?>
+<ds:datastoreItem xmlns:ds="http://schemas.openxmlformats.org/officeDocument/2006/customXml" ds:itemID="{AED196B3-28D2-4CE6-8BC6-FF9B8270B13E}">
+  <ds:schemaRefs>
+    <ds:schemaRef ds:uri="http://purl.org/dc/elements/1.1/"/>
+    <ds:schemaRef ds:uri="http://schemas.microsoft.com/office/2006/documentManagement/types"/>
+    <ds:schemaRef ds:uri="http://purl.org/dc/dcmitype/"/>
+    <ds:schemaRef ds:uri="8529ed79-734a-4657-bc3e-ffe023011016"/>
+    <ds:schemaRef ds:uri="http://purl.org/dc/terms/"/>
+    <ds:schemaRef ds:uri="http://schemas.microsoft.com/office/2006/metadata/properties"/>
+    <ds:schemaRef ds:uri="http://schemas.microsoft.com/office/infopath/2007/PartnerControls"/>
+    <ds:schemaRef ds:uri="http://schemas.openxmlformats.org/package/2006/metadata/core-properties"/>
+    <ds:schemaRef ds:uri="6673a5f0-d796-48d1-aef2-edb5346d3c37"/>
+    <ds:schemaRef ds:uri="http://www.w3.org/XML/1998/namespace"/>
+    <ds:schemaRef ds:uri="4b28dc4c-da69-43c9-a1ff-3a3813db799e"/>
+    <ds:schemaRef ds:uri="23ad9178-ade2-434f-a880-cfaf139256ed"/>
+  </ds:schemaRefs>
+</ds:datastoreItem>
 </file>
 
-<file path=customXml/item3.xml><?xml version="1.0" encoding="utf-8"?>
-<p:properties xmlns:p="http://schemas.microsoft.com/office/2006/metadata/properties" xmlns:xsi="http://www.w3.org/2001/XMLSchema-instance" xmlns:pc="http://schemas.microsoft.com/office/infopath/2007/PartnerControls">
-  <documentManagement>
-    <SharedWithUsers xmlns="4b28dc4c-da69-43c9-a1ff-3a3813db799e">
-      <UserInfo>
-        <DisplayName>Futrick, Jordan Q</DisplayName>
-        <AccountId>31</AccountId>
-        <AccountType/>
-      </UserInfo>
-      <UserInfo>
-        <DisplayName>Brown, Carrie</DisplayName>
-        <AccountId>84</AccountId>
-        <AccountType/>
-      </UserInfo>
-      <UserInfo>
-        <DisplayName>Leydig, Derek Martin</DisplayName>
-        <AccountId>38</AccountId>
-        <AccountType/>
-      </UserInfo>
-      <UserInfo>
-        <DisplayName>Jackson, Liam</DisplayName>
-        <AccountId>32</AccountId>
-        <AccountType/>
-      </UserInfo>
-      <UserInfo>
-        <DisplayName>Hey, Wolf</DisplayName>
-        <AccountId>182</AccountId>
-        <AccountType/>
-      </UserInfo>
-    </SharedWithUsers>
-    <TaxCatchAll xmlns="4b28dc4c-da69-43c9-a1ff-3a3813db799e" xsi:nil="true"/>
-    <lcf76f155ced4ddcb4097134ff3c332f xmlns="23ad9178-ade2-434f-a880-cfaf139256ed">
-      <Terms xmlns="http://schemas.microsoft.com/office/infopath/2007/PartnerControls"/>
-    </lcf76f155ced4ddcb4097134ff3c332f>
-  </documentManagement>
-</p:properties>
+<file path=customXml/itemProps2.xml><?xml version="1.0" encoding="utf-8"?>
+<ds:datastoreItem xmlns:ds="http://schemas.openxmlformats.org/officeDocument/2006/customXml" ds:itemID="{74FE70FB-0FCE-428C-BA58-AD39043535D1}">
+  <ds:schemaRefs>
+    <ds:schemaRef ds:uri="http://schemas.microsoft.com/sharepoint/v3/contenttype/forms"/>
+  </ds:schemaRefs>
+</ds:datastoreItem>
 </file>
 
-<file path=customXml/itemProps1.xml><?xml version="1.0" encoding="utf-8"?>
+<file path=customXml/itemProps3.xml><?xml version="1.0" encoding="utf-8"?>
 <ds:datastoreItem xmlns:ds="http://schemas.openxmlformats.org/officeDocument/2006/customXml" ds:itemID="{8DC5FBCA-8CEE-41E9-8E12-E7355B00A1CC}">
   <ds:schemaRefs>
     <ds:schemaRef ds:uri="http://schemas.microsoft.com/office/2006/metadata/contentType"/>
@@ -11584,31 +11611,6 @@
 </ds:datastoreItem>
 </file>
 
-<file path=customXml/itemProps2.xml><?xml version="1.0" encoding="utf-8"?>
-<ds:datastoreItem xmlns:ds="http://schemas.openxmlformats.org/officeDocument/2006/customXml" ds:itemID="{74FE70FB-0FCE-428C-BA58-AD39043535D1}">
-  <ds:schemaRefs>
-    <ds:schemaRef ds:uri="http://schemas.microsoft.com/sharepoint/v3/contenttype/forms"/>
-  </ds:schemaRefs>
-</ds:datastoreItem>
-</file>
-
-<file path=customXml/itemProps3.xml><?xml version="1.0" encoding="utf-8"?>
-<ds:datastoreItem xmlns:ds="http://schemas.openxmlformats.org/officeDocument/2006/customXml" ds:itemID="{AED196B3-28D2-4CE6-8BC6-FF9B8270B13E}">
-  <ds:schemaRefs>
-    <ds:schemaRef ds:uri="http://purl.org/dc/elements/1.1/"/>
-    <ds:schemaRef ds:uri="http://purl.org/dc/terms/"/>
-    <ds:schemaRef ds:uri="http://schemas.microsoft.com/office/infopath/2007/PartnerControls"/>
-    <ds:schemaRef ds:uri="http://www.w3.org/XML/1998/namespace"/>
-    <ds:schemaRef ds:uri="http://schemas.microsoft.com/office/2006/documentManagement/types"/>
-    <ds:schemaRef ds:uri="4b28dc4c-da69-43c9-a1ff-3a3813db799e"/>
-    <ds:schemaRef ds:uri="http://schemas.openxmlformats.org/package/2006/metadata/core-properties"/>
-    <ds:schemaRef ds:uri="23ad9178-ade2-434f-a880-cfaf139256ed"/>
-    <ds:schemaRef ds:uri="http://schemas.microsoft.com/office/2006/metadata/properties"/>
-    <ds:schemaRef ds:uri="http://purl.org/dc/dcmitype/"/>
-  </ds:schemaRefs>
-</ds:datastoreItem>
-</file>
-
 <file path=docMetadata/LabelInfo.xml><?xml version="1.0" encoding="utf-8"?>
 <clbl:labelList xmlns:clbl="http://schemas.microsoft.com/office/2020/mipLabelMetadata">
   <clbl:label id="{7cf48d45-3ddb-4389-a9c1-c115526eb52e}" enabled="0" method="" siteId="{7cf48d45-3ddb-4389-a9c1-c115526eb52e}" removed="1"/>

</xml_diff>